<commit_message>
Se actualiza Guia Detallada Instalacion y Ejecucion Proyecto + archivo README.txt
</commit_message>
<xml_diff>
--- a/Guia Detallada Instalacion y Ejecucion Proyecto/GUIA DETALLA CONFIGURACION PROYECTO.pptx
+++ b/Guia Detallada Instalacion y Ejecucion Proyecto/GUIA DETALLA CONFIGURACION PROYECTO.pptx
@@ -9550,15 +9550,8 @@
                     </a:srgbClr>
                   </a:outerShdw>
                 </a:effectLst>
-                <a:hlinkClick r:id="rId2">
-                  <a:extLst>
-                    <a:ext uri="{A12FA001-AC4F-418D-AE19-62706E023703}">
-                      <ahyp:hlinkClr xmlns:ahyp="http://schemas.microsoft.com/office/drawing/2018/hyperlinkcolor" val="tx"/>
-                    </a:ext>
-                  </a:extLst>
-                </a:hlinkClick>
-              </a:rPr>
-              <a:t>https://drive.google.com/drive/folders/1aHW1IV2FfPYvKbYi5ICyXSe5W7132ELN?usp=sharing</a:t>
+              </a:rPr>
+              <a:t>https://drive.google.com/drive/u/1/folders/1lTEP2jvtDPgIM72192FhpHMfxjldJ-Ij</a:t>
             </a:r>
             <a:br>
               <a:rPr lang="es-AR" sz="2000" b="1" dirty="0">
@@ -9606,7 +9599,7 @@
           </p:nvPr>
         </p:nvPicPr>
         <p:blipFill>
-          <a:blip r:embed="rId3">
+          <a:blip r:embed="rId2">
             <a:extLst>
               <a:ext uri="{28A0092B-C50C-407E-A947-70E740481C1C}">
                 <a14:useLocalDpi xmlns:a14="http://schemas.microsoft.com/office/drawing/2010/main" val="0"/>
@@ -10114,28 +10107,9 @@
                     </a:srgbClr>
                   </a:outerShdw>
                 </a:effectLst>
-                <a:hlinkClick r:id="rId2">
-                  <a:extLst>
-                    <a:ext uri="{A12FA001-AC4F-418D-AE19-62706E023703}">
-                      <ahyp:hlinkClr xmlns:ahyp="http://schemas.microsoft.com/office/drawing/2018/hyperlinkcolor" val="tx"/>
-                    </a:ext>
-                  </a:extLst>
-                </a:hlinkClick>
-              </a:rPr>
-              <a:t>https://drive.google.com/drive/folders/1aHW1IV2FfPYvKbYi5ICyXSe5W7132ELN?usp=sharing</a:t>
-            </a:r>
-            <a:endParaRPr lang="es-AR" sz="2400" b="1" dirty="0">
-              <a:solidFill>
-                <a:schemeClr val="bg1"/>
-              </a:solidFill>
-              <a:effectLst>
-                <a:outerShdw blurRad="38100" dist="38100" dir="2700000" algn="tl">
-                  <a:srgbClr val="000000">
-                    <a:alpha val="43137"/>
-                  </a:srgbClr>
-                </a:outerShdw>
-              </a:effectLst>
-            </a:endParaRPr>
+              </a:rPr>
+              <a:t>https://drive.google.com/drive/u/1/folders/1lTEP2jvtDPgIM72192FhpHMfxjldJ-Ij</a:t>
+            </a:r>
           </a:p>
           <a:p>
             <a:endParaRPr lang="es-AR" sz="2400" b="1" dirty="0">

</xml_diff>

<commit_message>
Se gestiona nueva Actualiacion de Guia Detallada Instalacion y Ejecucion Proyecto Maquina Virtual y archivo Readme.txt
</commit_message>
<xml_diff>
--- a/Guia Detallada Instalacion y Ejecucion Proyecto/GUIA DETALLA CONFIGURACION PROYECTO.pptx
+++ b/Guia Detallada Instalacion y Ejecucion Proyecto/GUIA DETALLA CONFIGURACION PROYECTO.pptx
@@ -317,7 +317,7 @@
           <a:p>
             <a:fld id="{6622E614-C442-4980-A111-CFFBFABE81DB}" type="datetimeFigureOut">
               <a:rPr lang="es-AR" smtClean="0"/>
-              <a:t>23/7/2021</a:t>
+              <a:t>24/7/2021</a:t>
             </a:fld>
             <a:endParaRPr lang="es-AR"/>
           </a:p>
@@ -753,7 +753,7 @@
           <a:p>
             <a:fld id="{6622E614-C442-4980-A111-CFFBFABE81DB}" type="datetimeFigureOut">
               <a:rPr lang="es-AR" smtClean="0"/>
-              <a:t>23/7/2021</a:t>
+              <a:t>24/7/2021</a:t>
             </a:fld>
             <a:endParaRPr lang="es-AR"/>
           </a:p>
@@ -1003,7 +1003,7 @@
           <a:p>
             <a:fld id="{6622E614-C442-4980-A111-CFFBFABE81DB}" type="datetimeFigureOut">
               <a:rPr lang="es-AR" smtClean="0"/>
-              <a:t>23/7/2021</a:t>
+              <a:t>24/7/2021</a:t>
             </a:fld>
             <a:endParaRPr lang="es-AR"/>
           </a:p>
@@ -1311,7 +1311,7 @@
           <a:p>
             <a:fld id="{6622E614-C442-4980-A111-CFFBFABE81DB}" type="datetimeFigureOut">
               <a:rPr lang="es-AR" smtClean="0"/>
-              <a:t>23/7/2021</a:t>
+              <a:t>24/7/2021</a:t>
             </a:fld>
             <a:endParaRPr lang="es-AR"/>
           </a:p>
@@ -1629,7 +1629,7 @@
           <a:p>
             <a:fld id="{6622E614-C442-4980-A111-CFFBFABE81DB}" type="datetimeFigureOut">
               <a:rPr lang="es-AR" smtClean="0"/>
-              <a:t>23/7/2021</a:t>
+              <a:t>24/7/2021</a:t>
             </a:fld>
             <a:endParaRPr lang="es-AR"/>
           </a:p>
@@ -1931,7 +1931,7 @@
           <a:p>
             <a:fld id="{6622E614-C442-4980-A111-CFFBFABE81DB}" type="datetimeFigureOut">
               <a:rPr lang="es-AR" smtClean="0"/>
-              <a:t>23/7/2021</a:t>
+              <a:t>24/7/2021</a:t>
             </a:fld>
             <a:endParaRPr lang="es-AR"/>
           </a:p>
@@ -2298,7 +2298,7 @@
           <a:p>
             <a:fld id="{6622E614-C442-4980-A111-CFFBFABE81DB}" type="datetimeFigureOut">
               <a:rPr lang="es-AR" smtClean="0"/>
-              <a:t>23/7/2021</a:t>
+              <a:t>24/7/2021</a:t>
             </a:fld>
             <a:endParaRPr lang="es-AR"/>
           </a:p>
@@ -2472,7 +2472,7 @@
           <a:p>
             <a:fld id="{6622E614-C442-4980-A111-CFFBFABE81DB}" type="datetimeFigureOut">
               <a:rPr lang="es-AR" smtClean="0"/>
-              <a:t>23/7/2021</a:t>
+              <a:t>24/7/2021</a:t>
             </a:fld>
             <a:endParaRPr lang="es-AR"/>
           </a:p>
@@ -2652,7 +2652,7 @@
           <a:p>
             <a:fld id="{6622E614-C442-4980-A111-CFFBFABE81DB}" type="datetimeFigureOut">
               <a:rPr lang="es-AR" smtClean="0"/>
-              <a:t>23/7/2021</a:t>
+              <a:t>24/7/2021</a:t>
             </a:fld>
             <a:endParaRPr lang="es-AR"/>
           </a:p>
@@ -2822,7 +2822,7 @@
           <a:p>
             <a:fld id="{6622E614-C442-4980-A111-CFFBFABE81DB}" type="datetimeFigureOut">
               <a:rPr lang="es-AR" smtClean="0"/>
-              <a:t>23/7/2021</a:t>
+              <a:t>24/7/2021</a:t>
             </a:fld>
             <a:endParaRPr lang="es-AR"/>
           </a:p>
@@ -3072,7 +3072,7 @@
           <a:p>
             <a:fld id="{6622E614-C442-4980-A111-CFFBFABE81DB}" type="datetimeFigureOut">
               <a:rPr lang="es-AR" smtClean="0"/>
-              <a:t>23/7/2021</a:t>
+              <a:t>24/7/2021</a:t>
             </a:fld>
             <a:endParaRPr lang="es-AR"/>
           </a:p>
@@ -3308,7 +3308,7 @@
           <a:p>
             <a:fld id="{6622E614-C442-4980-A111-CFFBFABE81DB}" type="datetimeFigureOut">
               <a:rPr lang="es-AR" smtClean="0"/>
-              <a:t>23/7/2021</a:t>
+              <a:t>24/7/2021</a:t>
             </a:fld>
             <a:endParaRPr lang="es-AR"/>
           </a:p>
@@ -3690,7 +3690,7 @@
           <a:p>
             <a:fld id="{6622E614-C442-4980-A111-CFFBFABE81DB}" type="datetimeFigureOut">
               <a:rPr lang="es-AR" smtClean="0"/>
-              <a:t>23/7/2021</a:t>
+              <a:t>24/7/2021</a:t>
             </a:fld>
             <a:endParaRPr lang="es-AR"/>
           </a:p>
@@ -3808,7 +3808,7 @@
           <a:p>
             <a:fld id="{6622E614-C442-4980-A111-CFFBFABE81DB}" type="datetimeFigureOut">
               <a:rPr lang="es-AR" smtClean="0"/>
-              <a:t>23/7/2021</a:t>
+              <a:t>24/7/2021</a:t>
             </a:fld>
             <a:endParaRPr lang="es-AR"/>
           </a:p>
@@ -3903,7 +3903,7 @@
           <a:p>
             <a:fld id="{6622E614-C442-4980-A111-CFFBFABE81DB}" type="datetimeFigureOut">
               <a:rPr lang="es-AR" smtClean="0"/>
-              <a:t>23/7/2021</a:t>
+              <a:t>24/7/2021</a:t>
             </a:fld>
             <a:endParaRPr lang="es-AR"/>
           </a:p>
@@ -4158,7 +4158,7 @@
           <a:p>
             <a:fld id="{6622E614-C442-4980-A111-CFFBFABE81DB}" type="datetimeFigureOut">
               <a:rPr lang="es-AR" smtClean="0"/>
-              <a:t>23/7/2021</a:t>
+              <a:t>24/7/2021</a:t>
             </a:fld>
             <a:endParaRPr lang="es-AR"/>
           </a:p>
@@ -4441,7 +4441,7 @@
           <a:p>
             <a:fld id="{6622E614-C442-4980-A111-CFFBFABE81DB}" type="datetimeFigureOut">
               <a:rPr lang="es-AR" smtClean="0"/>
-              <a:t>23/7/2021</a:t>
+              <a:t>24/7/2021</a:t>
             </a:fld>
             <a:endParaRPr lang="es-AR"/>
           </a:p>
@@ -4847,7 +4847,7 @@
           <a:p>
             <a:fld id="{6622E614-C442-4980-A111-CFFBFABE81DB}" type="datetimeFigureOut">
               <a:rPr lang="es-AR" smtClean="0"/>
-              <a:t>23/7/2021</a:t>
+              <a:t>24/7/2021</a:t>
             </a:fld>
             <a:endParaRPr lang="es-AR"/>
           </a:p>
@@ -5880,7 +5880,7 @@
                   </a:outerShdw>
                 </a:effectLst>
               </a:rPr>
-              <a:t>Downloads</a:t>
+              <a:t>Download</a:t>
             </a:r>
             <a:r>
               <a:rPr lang="es-AR" sz="2400" b="1" dirty="0">
@@ -9270,7 +9270,7 @@
                   </a:outerShdw>
                 </a:effectLst>
               </a:rPr>
-              <a:t>EN LA PRESENTE GUIA ACOMPAÑADA DE VIDEOS INSTRUCTIVO TUTORIAL SE EXPLICARA EN FORMA DETALLADA LA INSTALACION EN MAQUINA VIRTUAL (VIRTUAL BOX) SISTEMA OPERATIVO WINDOWS VISTA, Donde se instalara </a:t>
+              <a:t>EN LA PRESENTE GUIA ACOMPAÑADA DE VIDEOS INSTRUCTIVO TUTORIAL SE EXPLICARA EN FORMA DETALLADA LA INSTALACION EN MAQUINA VIRTUAL (VIRTUAL BOX) SISTEMA OPERATIVO WINDOWS 10, Donde se instalara </a:t>
             </a:r>
             <a:r>
               <a:rPr lang="es-AR" sz="2000" b="1" dirty="0" err="1">
@@ -9978,7 +9978,7 @@
         <p:spPr>
           <a:xfrm>
             <a:off x="267286" y="422031"/>
-            <a:ext cx="11662117" cy="5386090"/>
+            <a:ext cx="11662117" cy="6494085"/>
           </a:xfrm>
           <a:prstGeom prst="rect">
             <a:avLst/>
@@ -10060,7 +10060,7 @@
                   </a:outerShdw>
                 </a:effectLst>
               </a:rPr>
-              <a:t>En este caso seleccionamos Windows Vista 64 bits (Compatible) SP2</a:t>
+              <a:t>En este caso seleccionamos Windows 10 64 bits (Compatible)</a:t>
             </a:r>
           </a:p>
           <a:p>
@@ -10091,7 +10091,7 @@
                   </a:outerShdw>
                 </a:effectLst>
               </a:rPr>
-              <a:t>Link Google Drive Windows Vista 64 bits =&gt;</a:t>
+              <a:t>Previamente se descarga Imagen ISO de la Pagina Oficial Microsoft =&gt;</a:t>
             </a:r>
           </a:p>
           <a:p>
@@ -10108,7 +10108,7 @@
                   </a:outerShdw>
                 </a:effectLst>
               </a:rPr>
-              <a:t>https://drive.google.com/drive/u/1/folders/1lTEP2jvtDPgIM72192FhpHMfxjldJ-Ij</a:t>
+              <a:t>https://www.microsoft.com/es-es/software-download/windows10%20</a:t>
             </a:r>
           </a:p>
           <a:p>
@@ -10139,37 +10139,74 @@
                   </a:outerShdw>
                 </a:effectLst>
               </a:rPr>
-              <a:t>Una vez finalizada la descarga del archivo </a:t>
-            </a:r>
-            <a:r>
-              <a:rPr lang="es-AR" sz="2400" b="1" dirty="0" err="1">
-                <a:solidFill>
-                  <a:schemeClr val="bg1"/>
-                </a:solidFill>
-                <a:effectLst>
-                  <a:outerShdw blurRad="38100" dist="38100" dir="2700000" algn="tl">
-                    <a:srgbClr val="000000">
-                      <a:alpha val="43137"/>
-                    </a:srgbClr>
-                  </a:outerShdw>
-                </a:effectLst>
-              </a:rPr>
-              <a:t>iso</a:t>
-            </a:r>
+              <a:t>Link Google Drive Windows 10 64 bits =&gt;</a:t>
+            </a:r>
+          </a:p>
+          <a:p>
             <a:r>
               <a:rPr lang="es-AR" sz="2400" b="1" dirty="0">
                 <a:solidFill>
-                  <a:schemeClr val="bg1"/>
-                </a:solidFill>
-                <a:effectLst>
-                  <a:outerShdw blurRad="38100" dist="38100" dir="2700000" algn="tl">
-                    <a:srgbClr val="000000">
-                      <a:alpha val="43137"/>
-                    </a:srgbClr>
-                  </a:outerShdw>
-                </a:effectLst>
-              </a:rPr>
-              <a:t>, podemos proceder a montar el mismo en nuestra maquina virtual (VirtualBox).</a:t>
+                  <a:srgbClr val="FF0000"/>
+                </a:solidFill>
+                <a:effectLst>
+                  <a:outerShdw blurRad="38100" dist="38100" dir="2700000" algn="tl">
+                    <a:srgbClr val="000000">
+                      <a:alpha val="43137"/>
+                    </a:srgbClr>
+                  </a:outerShdw>
+                </a:effectLst>
+                <a:hlinkClick r:id="rId2">
+                  <a:extLst>
+                    <a:ext uri="{A12FA001-AC4F-418D-AE19-62706E023703}">
+                      <ahyp:hlinkClr xmlns:ahyp="http://schemas.microsoft.com/office/drawing/2018/hyperlinkcolor" val="tx"/>
+                    </a:ext>
+                  </a:extLst>
+                </a:hlinkClick>
+              </a:rPr>
+              <a:t>https://drive.google.com/drive/u/1/folders/1lTEP2jvtDPgIM72192FhpHMfxjldJ-Ij</a:t>
+            </a:r>
+            <a:endParaRPr lang="es-AR" sz="2400" b="1" dirty="0">
+              <a:solidFill>
+                <a:srgbClr val="FF0000"/>
+              </a:solidFill>
+              <a:effectLst>
+                <a:outerShdw blurRad="38100" dist="38100" dir="2700000" algn="tl">
+                  <a:srgbClr val="000000">
+                    <a:alpha val="43137"/>
+                  </a:srgbClr>
+                </a:outerShdw>
+              </a:effectLst>
+            </a:endParaRPr>
+          </a:p>
+          <a:p>
+            <a:endParaRPr lang="es-AR" sz="2400" b="1" dirty="0">
+              <a:solidFill>
+                <a:schemeClr val="bg1"/>
+              </a:solidFill>
+              <a:effectLst>
+                <a:outerShdw blurRad="38100" dist="38100" dir="2700000" algn="tl">
+                  <a:srgbClr val="000000">
+                    <a:alpha val="43137"/>
+                  </a:srgbClr>
+                </a:outerShdw>
+              </a:effectLst>
+            </a:endParaRPr>
+          </a:p>
+          <a:p>
+            <a:r>
+              <a:rPr lang="es-AR" sz="2400" b="1" dirty="0">
+                <a:solidFill>
+                  <a:schemeClr val="bg1"/>
+                </a:solidFill>
+                <a:effectLst>
+                  <a:outerShdw blurRad="38100" dist="38100" dir="2700000" algn="tl">
+                    <a:srgbClr val="000000">
+                      <a:alpha val="43137"/>
+                    </a:srgbClr>
+                  </a:outerShdw>
+                </a:effectLst>
+              </a:rPr>
+              <a:t>Una vez finalizada la descarga del archivo ISO, podemos proceder a montar el mismo en nuestra maquina virtual (VirtualBox).</a:t>
             </a:r>
           </a:p>
         </p:txBody>
@@ -10270,7 +10307,37 @@
                   </a:outerShdw>
                 </a:effectLst>
               </a:rPr>
-              <a:t>Montamos la imagen ISO (Sistema Operativo) en la maquina virtual (VirtualBox).</a:t>
+              <a:t>Montamos la imagen ISO (Sistema Operativo) en la maquina virtual (VirtualBox) </a:t>
+            </a:r>
+            <a:r>
+              <a:rPr lang="es-AR" sz="2400" b="1" dirty="0">
+                <a:solidFill>
+                  <a:srgbClr val="FF0000"/>
+                </a:solidFill>
+                <a:effectLst>
+                  <a:outerShdw blurRad="38100" dist="38100" dir="2700000" algn="tl">
+                    <a:srgbClr val="000000">
+                      <a:alpha val="43137"/>
+                    </a:srgbClr>
+                  </a:outerShdw>
+                </a:effectLst>
+              </a:rPr>
+              <a:t>CONFIGURACION</a:t>
+            </a:r>
+            <a:r>
+              <a:rPr lang="es-AR" sz="2400" b="1" dirty="0">
+                <a:solidFill>
+                  <a:schemeClr val="bg1"/>
+                </a:solidFill>
+                <a:effectLst>
+                  <a:outerShdw blurRad="38100" dist="38100" dir="2700000" algn="tl">
+                    <a:srgbClr val="000000">
+                      <a:alpha val="43137"/>
+                    </a:srgbClr>
+                  </a:outerShdw>
+                </a:effectLst>
+              </a:rPr>
+              <a:t>.</a:t>
             </a:r>
           </a:p>
           <a:p>
@@ -10301,7 +10368,7 @@
                   </a:outerShdw>
                 </a:effectLst>
               </a:rPr>
-              <a:t>En VirtualBox seleccionamos Nueva =&gt; En Nombre escribimos Windows vista =&gt; En Tipo seleccionamos Microsoft Windows =&gt; Seleccionamos en Versión si es la de 32 bits o 64 bits (Depende el ISO descargado) en nuestro caso seleccionamos la de 64 bits =&gt; NEXT</a:t>
+              <a:t>En VirtualBox seleccionamos Nueva =&gt; En Nombre escribimos Windows 10 =&gt; En Tipo seleccionamos Microsoft Windows =&gt; Seleccionamos en Versión si es la de 32 bits o 64 bits (Depende el ISO descargado) en nuestro caso seleccionamos la de 64 bits =&gt; NEXT</a:t>
             </a:r>
           </a:p>
           <a:p>
@@ -10332,7 +10399,7 @@
                   </a:outerShdw>
                 </a:effectLst>
               </a:rPr>
-              <a:t>Seleccionamos la RAM deseada =&gt; en nuestro caso 2049 MB (2GB) =&gt; NEXT</a:t>
+              <a:t>Seleccionamos la RAM deseada =&gt; en nuestro caso 4096 MB (4GB) =&gt; NEXT</a:t>
             </a:r>
           </a:p>
           <a:p>
@@ -10583,7 +10650,7 @@
         <p:spPr>
           <a:xfrm>
             <a:off x="196948" y="267286"/>
-            <a:ext cx="11816861" cy="6986528"/>
+            <a:ext cx="11816861" cy="6247864"/>
           </a:xfrm>
           <a:prstGeom prst="rect">
             <a:avLst/>
@@ -10701,7 +10768,7 @@
                   </a:outerShdw>
                 </a:effectLst>
               </a:rPr>
-              <a:t>Buscamos en nuestro directorio el archivo ISO (SO) descargado, seleccionamos la misma =&gt; INICIAR =&gt; monta la misma y comienza la instalación del SO Windows Vista 64 bits.</a:t>
+              <a:t>Buscamos en nuestro directorio el archivo ISO (SO) descargado, seleccionamos la misma =&gt; INICIAR =&gt; monta la misma y comienza el proceso de instalación del SO Windows 10 64 bits.</a:t>
             </a:r>
           </a:p>
           <a:p>
@@ -10811,21 +10878,6 @@
           </a:p>
           <a:p>
             <a:r>
-              <a:rPr lang="es-AR" sz="2400" b="1" dirty="0" err="1">
-                <a:solidFill>
-                  <a:schemeClr val="bg1"/>
-                </a:solidFill>
-                <a:effectLst>
-                  <a:outerShdw blurRad="38100" dist="38100" dir="2700000" algn="tl">
-                    <a:srgbClr val="000000">
-                      <a:alpha val="43137"/>
-                    </a:srgbClr>
-                  </a:outerShdw>
-                </a:effectLst>
-              </a:rPr>
-              <a:t>Destildamos</a:t>
-            </a:r>
-            <a:r>
               <a:rPr lang="es-AR" sz="2400" b="1" dirty="0">
                 <a:solidFill>
                   <a:schemeClr val="bg1"/>
@@ -10838,38 +10890,7 @@
                   </a:outerShdw>
                 </a:effectLst>
               </a:rPr>
-              <a:t> donde dice ingresar Serial y continuamos con siguiente.</a:t>
-            </a:r>
-          </a:p>
-          <a:p>
-            <a:endParaRPr lang="es-AR" sz="2400" b="1" dirty="0">
-              <a:solidFill>
-                <a:schemeClr val="bg1"/>
-              </a:solidFill>
-              <a:effectLst>
-                <a:outerShdw blurRad="38100" dist="38100" dir="2700000" algn="tl">
-                  <a:srgbClr val="000000">
-                    <a:alpha val="43137"/>
-                  </a:srgbClr>
-                </a:outerShdw>
-              </a:effectLst>
-            </a:endParaRPr>
-          </a:p>
-          <a:p>
-            <a:r>
-              <a:rPr lang="es-AR" sz="2400" b="1" dirty="0">
-                <a:solidFill>
-                  <a:schemeClr val="bg1"/>
-                </a:solidFill>
-                <a:effectLst>
-                  <a:outerShdw blurRad="38100" dist="38100" dir="2700000" algn="tl">
-                    <a:srgbClr val="000000">
-                      <a:alpha val="43137"/>
-                    </a:srgbClr>
-                  </a:outerShdw>
-                </a:effectLst>
-              </a:rPr>
-              <a:t>Seleccionamos la versión de Windows Vista =&gt; ULTIMATE =&gt; SIGUIENTE =&gt; Aceptamos el contrato.</a:t>
+              <a:t>Creamos la partición de memoria principal 30 GB y formateamos la misma, seleccionamos esta y damos en Siguiente.</a:t>
             </a:r>
           </a:p>
           <a:p>
@@ -10944,7 +10965,7 @@
         <p:spPr>
           <a:xfrm>
             <a:off x="347004" y="253218"/>
-            <a:ext cx="11596468" cy="5786199"/>
+            <a:ext cx="11596468" cy="7632859"/>
           </a:xfrm>
           <a:prstGeom prst="rect">
             <a:avLst/>
@@ -10959,9 +10980,6 @@
           <a:p>
             <a:r>
               <a:rPr lang="es-AR" sz="3200" b="1" dirty="0">
-                <a:solidFill>
-                  <a:schemeClr val="bg1"/>
-                </a:solidFill>
                 <a:effectLst>
                   <a:outerShdw blurRad="38100" dist="38100" dir="2700000" algn="tl">
                     <a:srgbClr val="000000">
@@ -11001,7 +11019,7 @@
                   </a:outerShdw>
                 </a:effectLst>
               </a:rPr>
-              <a:t>Seleccionamos Instalación Personalizada =&gt; Seleccionamos el disco duro creado de 30 GB =&gt; SIGUIENTE =&gt; Comienza con el proceso de Instalación.</a:t>
+              <a:t>Seleccionamos que no tenemos clave del producto =&gt; seleccionamos Windows 10 Pro =&gt; Aceptamos los términos de licencia.</a:t>
             </a:r>
           </a:p>
           <a:p>
@@ -11020,22 +11038,39 @@
           </a:p>
           <a:p>
             <a:r>
-              <a:rPr lang="es-AR" sz="2400" b="1" dirty="0">
-                <a:solidFill>
-                  <a:schemeClr val="bg1"/>
-                </a:solidFill>
-                <a:effectLst>
-                  <a:outerShdw blurRad="38100" dist="38100" dir="2700000" algn="tl">
-                    <a:srgbClr val="000000">
-                      <a:alpha val="43137"/>
-                    </a:srgbClr>
-                  </a:outerShdw>
-                </a:effectLst>
-              </a:rPr>
-              <a:t>Ahora nos permite seleccionar el Usuario (</a:t>
-            </a:r>
-            <a:r>
-              <a:rPr lang="es-AR" sz="2400" b="1" dirty="0" err="1">
+              <a:rPr lang="es-ES" sz="2400" b="1" dirty="0">
+                <a:solidFill>
+                  <a:schemeClr val="bg1"/>
+                </a:solidFill>
+                <a:effectLst>
+                  <a:outerShdw blurRad="38100" dist="38100" dir="2700000" algn="tl">
+                    <a:srgbClr val="000000">
+                      <a:alpha val="43137"/>
+                    </a:srgbClr>
+                  </a:outerShdw>
+                </a:effectLst>
+              </a:rPr>
+              <a:t>Usar Configuración rápida =&gt; seleccionamos unirse a un dominio local =&gt;</a:t>
+            </a:r>
+          </a:p>
+          <a:p>
+            <a:r>
+              <a:rPr lang="es-ES" sz="2400" b="1" dirty="0">
+                <a:solidFill>
+                  <a:schemeClr val="bg1"/>
+                </a:solidFill>
+                <a:effectLst>
+                  <a:outerShdw blurRad="38100" dist="38100" dir="2700000" algn="tl">
+                    <a:srgbClr val="000000">
+                      <a:alpha val="43137"/>
+                    </a:srgbClr>
+                  </a:outerShdw>
+                </a:effectLst>
+              </a:rPr>
+              <a:t>Ingresamos el nombre de usuario =&gt; </a:t>
+            </a:r>
+            <a:r>
+              <a:rPr lang="es-ES" sz="2400" b="1" dirty="0" err="1">
                 <a:solidFill>
                   <a:schemeClr val="bg1"/>
                 </a:solidFill>
@@ -11050,83 +11085,6 @@
               <a:t>admin</a:t>
             </a:r>
             <a:r>
-              <a:rPr lang="es-AR" sz="2400" b="1" dirty="0">
-                <a:solidFill>
-                  <a:schemeClr val="bg1"/>
-                </a:solidFill>
-                <a:effectLst>
-                  <a:outerShdw blurRad="38100" dist="38100" dir="2700000" algn="tl">
-                    <a:srgbClr val="000000">
-                      <a:alpha val="43137"/>
-                    </a:srgbClr>
-                  </a:outerShdw>
-                </a:effectLst>
-              </a:rPr>
-              <a:t>) y Contraseña (admin123).</a:t>
-            </a:r>
-          </a:p>
-          <a:p>
-            <a:endParaRPr lang="es-AR" sz="2400" b="1" dirty="0">
-              <a:solidFill>
-                <a:schemeClr val="bg1"/>
-              </a:solidFill>
-              <a:effectLst>
-                <a:outerShdw blurRad="38100" dist="38100" dir="2700000" algn="tl">
-                  <a:srgbClr val="000000">
-                    <a:alpha val="43137"/>
-                  </a:srgbClr>
-                </a:outerShdw>
-              </a:effectLst>
-            </a:endParaRPr>
-          </a:p>
-          <a:p>
-            <a:r>
-              <a:rPr lang="es-AR" sz="2400" b="1" dirty="0">
-                <a:solidFill>
-                  <a:schemeClr val="bg1"/>
-                </a:solidFill>
-                <a:effectLst>
-                  <a:outerShdw blurRad="38100" dist="38100" dir="2700000" algn="tl">
-                    <a:srgbClr val="000000">
-                      <a:alpha val="43137"/>
-                    </a:srgbClr>
-                  </a:outerShdw>
-                </a:effectLst>
-              </a:rPr>
-              <a:t>Escribimos en nombre del Equipo (admin1).</a:t>
-            </a:r>
-          </a:p>
-          <a:p>
-            <a:endParaRPr lang="es-AR" sz="2400" b="1" dirty="0">
-              <a:solidFill>
-                <a:schemeClr val="bg1"/>
-              </a:solidFill>
-              <a:effectLst>
-                <a:outerShdw blurRad="38100" dist="38100" dir="2700000" algn="tl">
-                  <a:srgbClr val="000000">
-                    <a:alpha val="43137"/>
-                  </a:srgbClr>
-                </a:outerShdw>
-              </a:effectLst>
-            </a:endParaRPr>
-          </a:p>
-          <a:p>
-            <a:r>
-              <a:rPr lang="es-AR" sz="2400" b="1" dirty="0">
-                <a:solidFill>
-                  <a:schemeClr val="bg1"/>
-                </a:solidFill>
-                <a:effectLst>
-                  <a:outerShdw blurRad="38100" dist="38100" dir="2700000" algn="tl">
-                    <a:srgbClr val="000000">
-                      <a:alpha val="43137"/>
-                    </a:srgbClr>
-                  </a:outerShdw>
-                </a:effectLst>
-              </a:rPr>
-              <a:t>Seleccionamos la zona horario =</a:t>
-            </a:r>
-            <a:r>
               <a:rPr lang="es-ES" sz="2400" b="1" dirty="0">
                 <a:solidFill>
                   <a:schemeClr val="bg1"/>
@@ -11139,7 +11097,7 @@
                   </a:outerShdw>
                 </a:effectLst>
               </a:rPr>
-              <a:t>&gt; Ubicación actual del Equipo (casa).</a:t>
+              <a:t> =&gt; contraseña =&gt; admin123</a:t>
             </a:r>
           </a:p>
           <a:p>
@@ -11170,7 +11128,369 @@
                   </a:outerShdw>
                 </a:effectLst>
               </a:rPr>
-              <a:t>Finaliza la Instalación del SO Windows Vista 64 bits (Maquina Virtual).</a:t>
+              <a:t>Finaliza la Instalación del SO Windows 10 64 bits (Maquina Virtual).</a:t>
+            </a:r>
+          </a:p>
+          <a:p>
+            <a:endParaRPr lang="es-ES" sz="2400" b="1" dirty="0">
+              <a:solidFill>
+                <a:schemeClr val="bg1"/>
+              </a:solidFill>
+              <a:effectLst>
+                <a:outerShdw blurRad="38100" dist="38100" dir="2700000" algn="tl">
+                  <a:srgbClr val="000000">
+                    <a:alpha val="43137"/>
+                  </a:srgbClr>
+                </a:outerShdw>
+              </a:effectLst>
+            </a:endParaRPr>
+          </a:p>
+          <a:p>
+            <a:r>
+              <a:rPr lang="es-ES" sz="2400" b="1" dirty="0">
+                <a:solidFill>
+                  <a:schemeClr val="bg1"/>
+                </a:solidFill>
+                <a:effectLst>
+                  <a:outerShdw blurRad="38100" dist="38100" dir="2700000" algn="tl">
+                    <a:srgbClr val="000000">
+                      <a:alpha val="43137"/>
+                    </a:srgbClr>
+                  </a:outerShdw>
+                </a:effectLst>
+              </a:rPr>
+              <a:t>Instalamos por ultimo un paquete de configuración =&gt; dispositivos (menú de virtual box) =&gt; Insertar imagen </a:t>
+            </a:r>
+            <a:r>
+              <a:rPr lang="es-ES" sz="2400" b="1" dirty="0" err="1">
+                <a:solidFill>
+                  <a:schemeClr val="bg1"/>
+                </a:solidFill>
+                <a:effectLst>
+                  <a:outerShdw blurRad="38100" dist="38100" dir="2700000" algn="tl">
+                    <a:srgbClr val="000000">
+                      <a:alpha val="43137"/>
+                    </a:srgbClr>
+                  </a:outerShdw>
+                </a:effectLst>
+              </a:rPr>
+              <a:t>Guest</a:t>
+            </a:r>
+            <a:r>
+              <a:rPr lang="es-ES" sz="2400" b="1" dirty="0">
+                <a:solidFill>
+                  <a:schemeClr val="bg1"/>
+                </a:solidFill>
+                <a:effectLst>
+                  <a:outerShdw blurRad="38100" dist="38100" dir="2700000" algn="tl">
+                    <a:srgbClr val="000000">
+                      <a:alpha val="43137"/>
+                    </a:srgbClr>
+                  </a:outerShdw>
+                </a:effectLst>
+              </a:rPr>
+              <a:t> </a:t>
+            </a:r>
+            <a:r>
+              <a:rPr lang="es-ES" sz="2400" b="1" dirty="0" err="1">
+                <a:solidFill>
+                  <a:schemeClr val="bg1"/>
+                </a:solidFill>
+                <a:effectLst>
+                  <a:outerShdw blurRad="38100" dist="38100" dir="2700000" algn="tl">
+                    <a:srgbClr val="000000">
+                      <a:alpha val="43137"/>
+                    </a:srgbClr>
+                  </a:outerShdw>
+                </a:effectLst>
+              </a:rPr>
+              <a:t>Additions</a:t>
+            </a:r>
+            <a:r>
+              <a:rPr lang="es-ES" sz="2400" b="1" dirty="0">
+                <a:solidFill>
+                  <a:schemeClr val="bg1"/>
+                </a:solidFill>
+                <a:effectLst>
+                  <a:outerShdw blurRad="38100" dist="38100" dir="2700000" algn="tl">
+                    <a:srgbClr val="000000">
+                      <a:alpha val="43137"/>
+                    </a:srgbClr>
+                  </a:outerShdw>
+                </a:effectLst>
+              </a:rPr>
+              <a:t> =&gt; vamos al explorador de Windows =&gt; damos doble </a:t>
+            </a:r>
+            <a:r>
+              <a:rPr lang="es-ES" sz="2400" b="1" dirty="0" err="1">
+                <a:solidFill>
+                  <a:schemeClr val="bg1"/>
+                </a:solidFill>
+                <a:effectLst>
+                  <a:outerShdw blurRad="38100" dist="38100" dir="2700000" algn="tl">
+                    <a:srgbClr val="000000">
+                      <a:alpha val="43137"/>
+                    </a:srgbClr>
+                  </a:outerShdw>
+                </a:effectLst>
+              </a:rPr>
+              <a:t>click</a:t>
+            </a:r>
+            <a:r>
+              <a:rPr lang="es-ES" sz="2400" b="1" dirty="0">
+                <a:solidFill>
+                  <a:schemeClr val="bg1"/>
+                </a:solidFill>
+                <a:effectLst>
+                  <a:outerShdw blurRad="38100" dist="38100" dir="2700000" algn="tl">
+                    <a:srgbClr val="000000">
+                      <a:alpha val="43137"/>
+                    </a:srgbClr>
+                  </a:outerShdw>
+                </a:effectLst>
+              </a:rPr>
+              <a:t> en </a:t>
+            </a:r>
+            <a:r>
+              <a:rPr lang="es-ES" sz="2400" b="1" dirty="0" err="1">
+                <a:solidFill>
+                  <a:schemeClr val="bg1"/>
+                </a:solidFill>
+                <a:effectLst>
+                  <a:outerShdw blurRad="38100" dist="38100" dir="2700000" algn="tl">
+                    <a:srgbClr val="000000">
+                      <a:alpha val="43137"/>
+                    </a:srgbClr>
+                  </a:outerShdw>
+                </a:effectLst>
+              </a:rPr>
+              <a:t>Guest</a:t>
+            </a:r>
+            <a:r>
+              <a:rPr lang="es-ES" sz="2400" b="1" dirty="0">
+                <a:solidFill>
+                  <a:schemeClr val="bg1"/>
+                </a:solidFill>
+                <a:effectLst>
+                  <a:outerShdw blurRad="38100" dist="38100" dir="2700000" algn="tl">
+                    <a:srgbClr val="000000">
+                      <a:alpha val="43137"/>
+                    </a:srgbClr>
+                  </a:outerShdw>
+                </a:effectLst>
+              </a:rPr>
+              <a:t> </a:t>
+            </a:r>
+            <a:r>
+              <a:rPr lang="es-ES" sz="2400" b="1" dirty="0" err="1">
+                <a:solidFill>
+                  <a:schemeClr val="bg1"/>
+                </a:solidFill>
+                <a:effectLst>
+                  <a:outerShdw blurRad="38100" dist="38100" dir="2700000" algn="tl">
+                    <a:srgbClr val="000000">
+                      <a:alpha val="43137"/>
+                    </a:srgbClr>
+                  </a:outerShdw>
+                </a:effectLst>
+              </a:rPr>
+              <a:t>Additions</a:t>
+            </a:r>
+            <a:r>
+              <a:rPr lang="es-ES" sz="2400" b="1" dirty="0">
+                <a:solidFill>
+                  <a:schemeClr val="bg1"/>
+                </a:solidFill>
+                <a:effectLst>
+                  <a:outerShdw blurRad="38100" dist="38100" dir="2700000" algn="tl">
+                    <a:srgbClr val="000000">
+                      <a:alpha val="43137"/>
+                    </a:srgbClr>
+                  </a:outerShdw>
+                </a:effectLst>
+              </a:rPr>
+              <a:t> =&gt; doble </a:t>
+            </a:r>
+            <a:r>
+              <a:rPr lang="es-ES" sz="2400" b="1" dirty="0" err="1">
+                <a:solidFill>
+                  <a:schemeClr val="bg1"/>
+                </a:solidFill>
+                <a:effectLst>
+                  <a:outerShdw blurRad="38100" dist="38100" dir="2700000" algn="tl">
+                    <a:srgbClr val="000000">
+                      <a:alpha val="43137"/>
+                    </a:srgbClr>
+                  </a:outerShdw>
+                </a:effectLst>
+              </a:rPr>
+              <a:t>click</a:t>
+            </a:r>
+            <a:r>
+              <a:rPr lang="es-ES" sz="2400" b="1" dirty="0">
+                <a:solidFill>
+                  <a:schemeClr val="bg1"/>
+                </a:solidFill>
+                <a:effectLst>
+                  <a:outerShdw blurRad="38100" dist="38100" dir="2700000" algn="tl">
+                    <a:srgbClr val="000000">
+                      <a:alpha val="43137"/>
+                    </a:srgbClr>
+                  </a:outerShdw>
+                </a:effectLst>
+              </a:rPr>
+              <a:t> en </a:t>
+            </a:r>
+            <a:r>
+              <a:rPr lang="es-ES" sz="2400" b="1" dirty="0" err="1">
+                <a:solidFill>
+                  <a:schemeClr val="bg1"/>
+                </a:solidFill>
+                <a:effectLst>
+                  <a:outerShdw blurRad="38100" dist="38100" dir="2700000" algn="tl">
+                    <a:srgbClr val="000000">
+                      <a:alpha val="43137"/>
+                    </a:srgbClr>
+                  </a:outerShdw>
+                </a:effectLst>
+              </a:rPr>
+              <a:t>VBoxWindowsAdditions</a:t>
+            </a:r>
+            <a:r>
+              <a:rPr lang="es-ES" sz="2400" b="1" dirty="0">
+                <a:solidFill>
+                  <a:schemeClr val="bg1"/>
+                </a:solidFill>
+                <a:effectLst>
+                  <a:outerShdw blurRad="38100" dist="38100" dir="2700000" algn="tl">
+                    <a:srgbClr val="000000">
+                      <a:alpha val="43137"/>
+                    </a:srgbClr>
+                  </a:outerShdw>
+                </a:effectLst>
+              </a:rPr>
+              <a:t> =&gt; Next =&gt; </a:t>
+            </a:r>
+            <a:r>
+              <a:rPr lang="es-ES" sz="2400" b="1" dirty="0" err="1">
+                <a:solidFill>
+                  <a:schemeClr val="bg1"/>
+                </a:solidFill>
+                <a:effectLst>
+                  <a:outerShdw blurRad="38100" dist="38100" dir="2700000" algn="tl">
+                    <a:srgbClr val="000000">
+                      <a:alpha val="43137"/>
+                    </a:srgbClr>
+                  </a:outerShdw>
+                </a:effectLst>
+              </a:rPr>
+              <a:t>Install</a:t>
+            </a:r>
+            <a:r>
+              <a:rPr lang="es-ES" sz="2400" b="1" dirty="0">
+                <a:solidFill>
+                  <a:schemeClr val="bg1"/>
+                </a:solidFill>
+                <a:effectLst>
+                  <a:outerShdw blurRad="38100" dist="38100" dir="2700000" algn="tl">
+                    <a:srgbClr val="000000">
+                      <a:alpha val="43137"/>
+                    </a:srgbClr>
+                  </a:outerShdw>
+                </a:effectLst>
+              </a:rPr>
+              <a:t> =&gt; </a:t>
+            </a:r>
+            <a:r>
+              <a:rPr lang="es-ES" sz="2400" b="1" dirty="0" err="1">
+                <a:solidFill>
+                  <a:schemeClr val="bg1"/>
+                </a:solidFill>
+                <a:effectLst>
+                  <a:outerShdw blurRad="38100" dist="38100" dir="2700000" algn="tl">
+                    <a:srgbClr val="000000">
+                      <a:alpha val="43137"/>
+                    </a:srgbClr>
+                  </a:outerShdw>
+                </a:effectLst>
+              </a:rPr>
+              <a:t>Reboot</a:t>
+            </a:r>
+            <a:r>
+              <a:rPr lang="es-ES" sz="2400" b="1" dirty="0">
+                <a:solidFill>
+                  <a:schemeClr val="bg1"/>
+                </a:solidFill>
+                <a:effectLst>
+                  <a:outerShdw blurRad="38100" dist="38100" dir="2700000" algn="tl">
+                    <a:srgbClr val="000000">
+                      <a:alpha val="43137"/>
+                    </a:srgbClr>
+                  </a:outerShdw>
+                </a:effectLst>
+              </a:rPr>
+              <a:t> </a:t>
+            </a:r>
+            <a:r>
+              <a:rPr lang="es-ES" sz="2400" b="1" dirty="0" err="1">
+                <a:solidFill>
+                  <a:schemeClr val="bg1"/>
+                </a:solidFill>
+                <a:effectLst>
+                  <a:outerShdw blurRad="38100" dist="38100" dir="2700000" algn="tl">
+                    <a:srgbClr val="000000">
+                      <a:alpha val="43137"/>
+                    </a:srgbClr>
+                  </a:outerShdw>
+                </a:effectLst>
+              </a:rPr>
+              <a:t>Now</a:t>
+            </a:r>
+            <a:r>
+              <a:rPr lang="es-ES" sz="2400" b="1" dirty="0">
+                <a:solidFill>
+                  <a:schemeClr val="bg1"/>
+                </a:solidFill>
+                <a:effectLst>
+                  <a:outerShdw blurRad="38100" dist="38100" dir="2700000" algn="tl">
+                    <a:srgbClr val="000000">
+                      <a:alpha val="43137"/>
+                    </a:srgbClr>
+                  </a:outerShdw>
+                </a:effectLst>
+              </a:rPr>
+              <a:t> =&gt; Reiniciamos</a:t>
+            </a:r>
+          </a:p>
+          <a:p>
+            <a:endParaRPr lang="es-ES" sz="2400" b="1" dirty="0">
+              <a:solidFill>
+                <a:schemeClr val="bg1"/>
+              </a:solidFill>
+              <a:effectLst>
+                <a:outerShdw blurRad="38100" dist="38100" dir="2700000" algn="tl">
+                  <a:srgbClr val="000000">
+                    <a:alpha val="43137"/>
+                  </a:srgbClr>
+                </a:outerShdw>
+              </a:effectLst>
+            </a:endParaRPr>
+          </a:p>
+          <a:p>
+            <a:r>
+              <a:rPr lang="es-ES" sz="2400" b="1" dirty="0">
+                <a:solidFill>
+                  <a:schemeClr val="bg1"/>
+                </a:solidFill>
+                <a:effectLst>
+                  <a:outerShdw blurRad="38100" dist="38100" dir="2700000" algn="tl">
+                    <a:srgbClr val="000000">
+                      <a:alpha val="43137"/>
+                    </a:srgbClr>
+                  </a:outerShdw>
+                </a:effectLst>
+              </a:rPr>
+              <a:t>Logramos mejor integración entre la maquina virtual y el sistema operativo principal.</a:t>
             </a:r>
             <a:endParaRPr lang="es-AR" sz="2400" b="1" dirty="0">
               <a:solidFill>

</xml_diff>

<commit_message>
Se completa Guia Detallada Instalacion y Ejecucion Proyecto en Maquina Virtual + Se suben Video Tutoriales Drive + Se actualiza Readme.txt
</commit_message>
<xml_diff>
--- a/Guia Detallada Instalacion y Ejecucion Proyecto/GUIA DETALLA CONFIGURACION PROYECTO.pptx
+++ b/Guia Detallada Instalacion y Ejecucion Proyecto/GUIA DETALLA CONFIGURACION PROYECTO.pptx
@@ -317,7 +317,7 @@
           <a:p>
             <a:fld id="{6622E614-C442-4980-A111-CFFBFABE81DB}" type="datetimeFigureOut">
               <a:rPr lang="es-AR" smtClean="0"/>
-              <a:t>24/7/2021</a:t>
+              <a:t>25/7/2021</a:t>
             </a:fld>
             <a:endParaRPr lang="es-AR"/>
           </a:p>
@@ -753,7 +753,7 @@
           <a:p>
             <a:fld id="{6622E614-C442-4980-A111-CFFBFABE81DB}" type="datetimeFigureOut">
               <a:rPr lang="es-AR" smtClean="0"/>
-              <a:t>24/7/2021</a:t>
+              <a:t>25/7/2021</a:t>
             </a:fld>
             <a:endParaRPr lang="es-AR"/>
           </a:p>
@@ -1003,7 +1003,7 @@
           <a:p>
             <a:fld id="{6622E614-C442-4980-A111-CFFBFABE81DB}" type="datetimeFigureOut">
               <a:rPr lang="es-AR" smtClean="0"/>
-              <a:t>24/7/2021</a:t>
+              <a:t>25/7/2021</a:t>
             </a:fld>
             <a:endParaRPr lang="es-AR"/>
           </a:p>
@@ -1311,7 +1311,7 @@
           <a:p>
             <a:fld id="{6622E614-C442-4980-A111-CFFBFABE81DB}" type="datetimeFigureOut">
               <a:rPr lang="es-AR" smtClean="0"/>
-              <a:t>24/7/2021</a:t>
+              <a:t>25/7/2021</a:t>
             </a:fld>
             <a:endParaRPr lang="es-AR"/>
           </a:p>
@@ -1629,7 +1629,7 @@
           <a:p>
             <a:fld id="{6622E614-C442-4980-A111-CFFBFABE81DB}" type="datetimeFigureOut">
               <a:rPr lang="es-AR" smtClean="0"/>
-              <a:t>24/7/2021</a:t>
+              <a:t>25/7/2021</a:t>
             </a:fld>
             <a:endParaRPr lang="es-AR"/>
           </a:p>
@@ -1931,7 +1931,7 @@
           <a:p>
             <a:fld id="{6622E614-C442-4980-A111-CFFBFABE81DB}" type="datetimeFigureOut">
               <a:rPr lang="es-AR" smtClean="0"/>
-              <a:t>24/7/2021</a:t>
+              <a:t>25/7/2021</a:t>
             </a:fld>
             <a:endParaRPr lang="es-AR"/>
           </a:p>
@@ -2298,7 +2298,7 @@
           <a:p>
             <a:fld id="{6622E614-C442-4980-A111-CFFBFABE81DB}" type="datetimeFigureOut">
               <a:rPr lang="es-AR" smtClean="0"/>
-              <a:t>24/7/2021</a:t>
+              <a:t>25/7/2021</a:t>
             </a:fld>
             <a:endParaRPr lang="es-AR"/>
           </a:p>
@@ -2472,7 +2472,7 @@
           <a:p>
             <a:fld id="{6622E614-C442-4980-A111-CFFBFABE81DB}" type="datetimeFigureOut">
               <a:rPr lang="es-AR" smtClean="0"/>
-              <a:t>24/7/2021</a:t>
+              <a:t>25/7/2021</a:t>
             </a:fld>
             <a:endParaRPr lang="es-AR"/>
           </a:p>
@@ -2652,7 +2652,7 @@
           <a:p>
             <a:fld id="{6622E614-C442-4980-A111-CFFBFABE81DB}" type="datetimeFigureOut">
               <a:rPr lang="es-AR" smtClean="0"/>
-              <a:t>24/7/2021</a:t>
+              <a:t>25/7/2021</a:t>
             </a:fld>
             <a:endParaRPr lang="es-AR"/>
           </a:p>
@@ -2822,7 +2822,7 @@
           <a:p>
             <a:fld id="{6622E614-C442-4980-A111-CFFBFABE81DB}" type="datetimeFigureOut">
               <a:rPr lang="es-AR" smtClean="0"/>
-              <a:t>24/7/2021</a:t>
+              <a:t>25/7/2021</a:t>
             </a:fld>
             <a:endParaRPr lang="es-AR"/>
           </a:p>
@@ -3072,7 +3072,7 @@
           <a:p>
             <a:fld id="{6622E614-C442-4980-A111-CFFBFABE81DB}" type="datetimeFigureOut">
               <a:rPr lang="es-AR" smtClean="0"/>
-              <a:t>24/7/2021</a:t>
+              <a:t>25/7/2021</a:t>
             </a:fld>
             <a:endParaRPr lang="es-AR"/>
           </a:p>
@@ -3308,7 +3308,7 @@
           <a:p>
             <a:fld id="{6622E614-C442-4980-A111-CFFBFABE81DB}" type="datetimeFigureOut">
               <a:rPr lang="es-AR" smtClean="0"/>
-              <a:t>24/7/2021</a:t>
+              <a:t>25/7/2021</a:t>
             </a:fld>
             <a:endParaRPr lang="es-AR"/>
           </a:p>
@@ -3690,7 +3690,7 @@
           <a:p>
             <a:fld id="{6622E614-C442-4980-A111-CFFBFABE81DB}" type="datetimeFigureOut">
               <a:rPr lang="es-AR" smtClean="0"/>
-              <a:t>24/7/2021</a:t>
+              <a:t>25/7/2021</a:t>
             </a:fld>
             <a:endParaRPr lang="es-AR"/>
           </a:p>
@@ -3808,7 +3808,7 @@
           <a:p>
             <a:fld id="{6622E614-C442-4980-A111-CFFBFABE81DB}" type="datetimeFigureOut">
               <a:rPr lang="es-AR" smtClean="0"/>
-              <a:t>24/7/2021</a:t>
+              <a:t>25/7/2021</a:t>
             </a:fld>
             <a:endParaRPr lang="es-AR"/>
           </a:p>
@@ -3903,7 +3903,7 @@
           <a:p>
             <a:fld id="{6622E614-C442-4980-A111-CFFBFABE81DB}" type="datetimeFigureOut">
               <a:rPr lang="es-AR" smtClean="0"/>
-              <a:t>24/7/2021</a:t>
+              <a:t>25/7/2021</a:t>
             </a:fld>
             <a:endParaRPr lang="es-AR"/>
           </a:p>
@@ -4158,7 +4158,7 @@
           <a:p>
             <a:fld id="{6622E614-C442-4980-A111-CFFBFABE81DB}" type="datetimeFigureOut">
               <a:rPr lang="es-AR" smtClean="0"/>
-              <a:t>24/7/2021</a:t>
+              <a:t>25/7/2021</a:t>
             </a:fld>
             <a:endParaRPr lang="es-AR"/>
           </a:p>
@@ -4441,7 +4441,7 @@
           <a:p>
             <a:fld id="{6622E614-C442-4980-A111-CFFBFABE81DB}" type="datetimeFigureOut">
               <a:rPr lang="es-AR" smtClean="0"/>
-              <a:t>24/7/2021</a:t>
+              <a:t>25/7/2021</a:t>
             </a:fld>
             <a:endParaRPr lang="es-AR"/>
           </a:p>
@@ -4847,7 +4847,7 @@
           <a:p>
             <a:fld id="{6622E614-C442-4980-A111-CFFBFABE81DB}" type="datetimeFigureOut">
               <a:rPr lang="es-AR" smtClean="0"/>
-              <a:t>24/7/2021</a:t>
+              <a:t>25/7/2021</a:t>
             </a:fld>
             <a:endParaRPr lang="es-AR"/>
           </a:p>
@@ -5548,7 +5548,7 @@
         <p:spPr>
           <a:xfrm>
             <a:off x="187569" y="140677"/>
-            <a:ext cx="11816861" cy="6894195"/>
+            <a:ext cx="11816861" cy="5724644"/>
           </a:xfrm>
           <a:prstGeom prst="rect">
             <a:avLst/>
@@ -5666,6 +5666,67 @@
             </a:r>
           </a:p>
           <a:p>
+            <a:endParaRPr lang="es-AR" sz="2000" b="1" dirty="0">
+              <a:solidFill>
+                <a:schemeClr val="bg1"/>
+              </a:solidFill>
+              <a:effectLst>
+                <a:outerShdw blurRad="38100" dist="38100" dir="2700000" algn="tl">
+                  <a:srgbClr val="000000">
+                    <a:alpha val="43137"/>
+                  </a:srgbClr>
+                </a:outerShdw>
+              </a:effectLst>
+            </a:endParaRPr>
+          </a:p>
+          <a:p>
+            <a:r>
+              <a:rPr lang="es-AR" sz="2400" b="1" dirty="0">
+                <a:solidFill>
+                  <a:schemeClr val="bg1"/>
+                </a:solidFill>
+                <a:effectLst>
+                  <a:outerShdw blurRad="38100" dist="38100" dir="2700000" algn="tl">
+                    <a:srgbClr val="000000">
+                      <a:alpha val="43137"/>
+                    </a:srgbClr>
+                  </a:outerShdw>
+                </a:effectLst>
+              </a:rPr>
+              <a:t>Importante Tiene que ser la versión </a:t>
+            </a:r>
+            <a:r>
+              <a:rPr lang="es-AR" sz="2400" b="1" dirty="0" err="1">
+                <a:solidFill>
+                  <a:schemeClr val="bg1"/>
+                </a:solidFill>
+                <a:effectLst>
+                  <a:outerShdw blurRad="38100" dist="38100" dir="2700000" algn="tl">
+                    <a:srgbClr val="000000">
+                      <a:alpha val="43137"/>
+                    </a:srgbClr>
+                  </a:outerShdw>
+                </a:effectLst>
+              </a:rPr>
+              <a:t>community</a:t>
+            </a:r>
+            <a:r>
+              <a:rPr lang="es-AR" sz="2400" b="1" dirty="0">
+                <a:solidFill>
+                  <a:schemeClr val="bg1"/>
+                </a:solidFill>
+                <a:effectLst>
+                  <a:outerShdw blurRad="38100" dist="38100" dir="2700000" algn="tl">
+                    <a:srgbClr val="000000">
+                      <a:alpha val="43137"/>
+                    </a:srgbClr>
+                  </a:outerShdw>
+                </a:effectLst>
+              </a:rPr>
+              <a:t> server 5.7.31 por compatibilidad, se sube el instalador al drive.</a:t>
+            </a:r>
+          </a:p>
+          <a:p>
             <a:endParaRPr lang="es-AR" sz="2400" b="1" dirty="0">
               <a:solidFill>
                 <a:schemeClr val="bg1"/>
@@ -5693,41 +5754,11 @@
                   </a:outerShdw>
                 </a:effectLst>
               </a:rPr>
-              <a:t>Link Pagina Oficial </a:t>
-            </a:r>
-            <a:r>
-              <a:rPr lang="es-AR" sz="2400" b="1" dirty="0" err="1">
-                <a:solidFill>
-                  <a:schemeClr val="bg1"/>
-                </a:solidFill>
-                <a:effectLst>
-                  <a:outerShdw blurRad="38100" dist="38100" dir="2700000" algn="tl">
-                    <a:srgbClr val="000000">
-                      <a:alpha val="43137"/>
-                    </a:srgbClr>
-                  </a:outerShdw>
-                </a:effectLst>
-              </a:rPr>
-              <a:t>MySql</a:t>
+              <a:t>Link  Drive =&gt; </a:t>
             </a:r>
             <a:r>
               <a:rPr lang="es-AR" sz="2400" b="1" dirty="0">
                 <a:solidFill>
-                  <a:schemeClr val="bg1"/>
-                </a:solidFill>
-                <a:effectLst>
-                  <a:outerShdw blurRad="38100" dist="38100" dir="2700000" algn="tl">
-                    <a:srgbClr val="000000">
-                      <a:alpha val="43137"/>
-                    </a:srgbClr>
-                  </a:outerShdw>
-                </a:effectLst>
-              </a:rPr>
-              <a:t> =&gt; </a:t>
-            </a:r>
-            <a:r>
-              <a:rPr lang="es-AR" sz="2400" b="1" dirty="0">
-                <a:solidFill>
                   <a:srgbClr val="FF0000"/>
                 </a:solidFill>
                 <a:effectLst>
@@ -5737,258 +5768,8 @@
                     </a:srgbClr>
                   </a:outerShdw>
                 </a:effectLst>
-                <a:hlinkClick r:id="rId2">
-                  <a:extLst>
-                    <a:ext uri="{A12FA001-AC4F-418D-AE19-62706E023703}">
-                      <ahyp:hlinkClr xmlns:ahyp="http://schemas.microsoft.com/office/drawing/2018/hyperlinkcolor" val="tx"/>
-                    </a:ext>
-                  </a:extLst>
-                </a:hlinkClick>
-              </a:rPr>
-              <a:t>https://www.mysql.com/products/workbench/</a:t>
-            </a:r>
-            <a:endParaRPr lang="es-AR" sz="2400" b="1" dirty="0">
-              <a:solidFill>
-                <a:srgbClr val="FF0000"/>
-              </a:solidFill>
-              <a:effectLst>
-                <a:outerShdw blurRad="38100" dist="38100" dir="2700000" algn="tl">
-                  <a:srgbClr val="000000">
-                    <a:alpha val="43137"/>
-                  </a:srgbClr>
-                </a:outerShdw>
-              </a:effectLst>
-            </a:endParaRPr>
-          </a:p>
-          <a:p>
-            <a:endParaRPr lang="es-AR" sz="2400" b="1" dirty="0">
-              <a:solidFill>
-                <a:schemeClr val="bg1"/>
-              </a:solidFill>
-              <a:effectLst>
-                <a:outerShdw blurRad="38100" dist="38100" dir="2700000" algn="tl">
-                  <a:srgbClr val="000000">
-                    <a:alpha val="43137"/>
-                  </a:srgbClr>
-                </a:outerShdw>
-              </a:effectLst>
-            </a:endParaRPr>
-          </a:p>
-          <a:p>
-            <a:r>
-              <a:rPr lang="es-AR" sz="2400" b="1" dirty="0">
-                <a:solidFill>
-                  <a:schemeClr val="bg1"/>
-                </a:solidFill>
-                <a:effectLst>
-                  <a:outerShdw blurRad="38100" dist="38100" dir="2700000" algn="tl">
-                    <a:srgbClr val="000000">
-                      <a:alpha val="43137"/>
-                    </a:srgbClr>
-                  </a:outerShdw>
-                </a:effectLst>
-              </a:rPr>
-              <a:t>Vamos a la pestaña de </a:t>
-            </a:r>
-            <a:r>
-              <a:rPr lang="es-AR" sz="2400" b="1" dirty="0" err="1">
-                <a:solidFill>
-                  <a:schemeClr val="bg1"/>
-                </a:solidFill>
-                <a:effectLst>
-                  <a:outerShdw blurRad="38100" dist="38100" dir="2700000" algn="tl">
-                    <a:srgbClr val="000000">
-                      <a:alpha val="43137"/>
-                    </a:srgbClr>
-                  </a:outerShdw>
-                </a:effectLst>
-              </a:rPr>
-              <a:t>Downloads</a:t>
-            </a:r>
-            <a:r>
-              <a:rPr lang="es-AR" sz="2400" b="1" dirty="0">
-                <a:solidFill>
-                  <a:schemeClr val="bg1"/>
-                </a:solidFill>
-                <a:effectLst>
-                  <a:outerShdw blurRad="38100" dist="38100" dir="2700000" algn="tl">
-                    <a:srgbClr val="000000">
-                      <a:alpha val="43137"/>
-                    </a:srgbClr>
-                  </a:outerShdw>
-                </a:effectLst>
-              </a:rPr>
-              <a:t> =&gt; al final de la pagina seleccionamos </a:t>
-            </a:r>
-          </a:p>
-          <a:p>
-            <a:r>
-              <a:rPr lang="es-AR" sz="2400" b="1" dirty="0">
-                <a:solidFill>
-                  <a:schemeClr val="bg1"/>
-                </a:solidFill>
-                <a:effectLst>
-                  <a:outerShdw blurRad="38100" dist="38100" dir="2700000" algn="tl">
-                    <a:srgbClr val="000000">
-                      <a:alpha val="43137"/>
-                    </a:srgbClr>
-                  </a:outerShdw>
-                </a:effectLst>
-              </a:rPr>
-              <a:t>MySQL </a:t>
-            </a:r>
-            <a:r>
-              <a:rPr lang="es-AR" sz="2400" b="1" dirty="0" err="1">
-                <a:solidFill>
-                  <a:schemeClr val="bg1"/>
-                </a:solidFill>
-                <a:effectLst>
-                  <a:outerShdw blurRad="38100" dist="38100" dir="2700000" algn="tl">
-                    <a:srgbClr val="000000">
-                      <a:alpha val="43137"/>
-                    </a:srgbClr>
-                  </a:outerShdw>
-                </a:effectLst>
-              </a:rPr>
-              <a:t>Community</a:t>
-            </a:r>
-            <a:r>
-              <a:rPr lang="es-AR" sz="2400" b="1" dirty="0">
-                <a:solidFill>
-                  <a:schemeClr val="bg1"/>
-                </a:solidFill>
-                <a:effectLst>
-                  <a:outerShdw blurRad="38100" dist="38100" dir="2700000" algn="tl">
-                    <a:srgbClr val="000000">
-                      <a:alpha val="43137"/>
-                    </a:srgbClr>
-                  </a:outerShdw>
-                </a:effectLst>
-              </a:rPr>
-              <a:t> (GPL) </a:t>
-            </a:r>
-            <a:r>
-              <a:rPr lang="es-AR" sz="2400" b="1" dirty="0" err="1">
-                <a:solidFill>
-                  <a:schemeClr val="bg1"/>
-                </a:solidFill>
-                <a:effectLst>
-                  <a:outerShdw blurRad="38100" dist="38100" dir="2700000" algn="tl">
-                    <a:srgbClr val="000000">
-                      <a:alpha val="43137"/>
-                    </a:srgbClr>
-                  </a:outerShdw>
-                </a:effectLst>
-              </a:rPr>
-              <a:t>Download</a:t>
-            </a:r>
-            <a:r>
-              <a:rPr lang="es-AR" sz="2400" b="1" dirty="0">
-                <a:solidFill>
-                  <a:schemeClr val="bg1"/>
-                </a:solidFill>
-                <a:effectLst>
-                  <a:outerShdw blurRad="38100" dist="38100" dir="2700000" algn="tl">
-                    <a:srgbClr val="000000">
-                      <a:alpha val="43137"/>
-                    </a:srgbClr>
-                  </a:outerShdw>
-                </a:effectLst>
-              </a:rPr>
-              <a:t> =&gt; Y luego seleccionamos </a:t>
-            </a:r>
-          </a:p>
-          <a:p>
-            <a:r>
-              <a:rPr lang="es-AR" sz="2400" b="1" dirty="0">
-                <a:solidFill>
-                  <a:schemeClr val="bg1"/>
-                </a:solidFill>
-                <a:effectLst>
-                  <a:outerShdw blurRad="38100" dist="38100" dir="2700000" algn="tl">
-                    <a:srgbClr val="000000">
-                      <a:alpha val="43137"/>
-                    </a:srgbClr>
-                  </a:outerShdw>
-                </a:effectLst>
-              </a:rPr>
-              <a:t>MySQL </a:t>
-            </a:r>
-            <a:r>
-              <a:rPr lang="es-AR" sz="2400" b="1" dirty="0" err="1">
-                <a:solidFill>
-                  <a:schemeClr val="bg1"/>
-                </a:solidFill>
-                <a:effectLst>
-                  <a:outerShdw blurRad="38100" dist="38100" dir="2700000" algn="tl">
-                    <a:srgbClr val="000000">
-                      <a:alpha val="43137"/>
-                    </a:srgbClr>
-                  </a:outerShdw>
-                </a:effectLst>
-              </a:rPr>
-              <a:t>Community</a:t>
-            </a:r>
-            <a:r>
-              <a:rPr lang="es-AR" sz="2400" b="1" dirty="0">
-                <a:solidFill>
-                  <a:schemeClr val="bg1"/>
-                </a:solidFill>
-                <a:effectLst>
-                  <a:outerShdw blurRad="38100" dist="38100" dir="2700000" algn="tl">
-                    <a:srgbClr val="000000">
-                      <a:alpha val="43137"/>
-                    </a:srgbClr>
-                  </a:outerShdw>
-                </a:effectLst>
-              </a:rPr>
-              <a:t> Server.</a:t>
-            </a:r>
-          </a:p>
-          <a:p>
-            <a:endParaRPr lang="es-AR" sz="2400" b="1" dirty="0">
-              <a:solidFill>
-                <a:schemeClr val="bg1"/>
-              </a:solidFill>
-              <a:effectLst>
-                <a:outerShdw blurRad="38100" dist="38100" dir="2700000" algn="tl">
-                  <a:srgbClr val="000000">
-                    <a:alpha val="43137"/>
-                  </a:srgbClr>
-                </a:outerShdw>
-              </a:effectLst>
-            </a:endParaRPr>
-          </a:p>
-          <a:p>
-            <a:r>
-              <a:rPr lang="es-AR" sz="2400" b="1" dirty="0">
-                <a:solidFill>
-                  <a:schemeClr val="bg1"/>
-                </a:solidFill>
-                <a:effectLst>
-                  <a:outerShdw blurRad="38100" dist="38100" dir="2700000" algn="tl">
-                    <a:srgbClr val="000000">
-                      <a:alpha val="43137"/>
-                    </a:srgbClr>
-                  </a:outerShdw>
-                </a:effectLst>
-              </a:rPr>
-              <a:t>Se recomienda siempre buscar una versión anterior ya que se predispone a ser mas estable para eso presionamos en =&gt; </a:t>
-            </a:r>
-            <a:r>
-              <a:rPr lang="en-US" sz="2400" b="1" dirty="0">
-                <a:solidFill>
-                  <a:schemeClr val="bg1"/>
-                </a:solidFill>
-                <a:effectLst>
-                  <a:outerShdw blurRad="38100" dist="38100" dir="2700000" algn="tl">
-                    <a:srgbClr val="000000">
-                      <a:alpha val="43137"/>
-                    </a:srgbClr>
-                  </a:outerShdw>
-                </a:effectLst>
-              </a:rPr>
-              <a:t>Looking for the latest GA version?</a:t>
+              </a:rPr>
+              <a:t>https://drive.google.com/drive/u/1/folders/1lTEP2jvtDPgIM72192FhpHMfxjldJ-Ij</a:t>
             </a:r>
           </a:p>
           <a:p>
@@ -8384,7 +8165,37 @@
                   </a:outerShdw>
                 </a:effectLst>
               </a:rPr>
-              <a:t> =&gt; nombramos la misma =&gt; </a:t>
+              <a:t> =&gt; nombramos la misma (nombre = </a:t>
+            </a:r>
+            <a:r>
+              <a:rPr lang="es-AR" sz="2000" b="1" dirty="0" err="1">
+                <a:solidFill>
+                  <a:schemeClr val="bg1"/>
+                </a:solidFill>
+                <a:effectLst>
+                  <a:outerShdw blurRad="38100" dist="38100" dir="2700000" algn="tl">
+                    <a:srgbClr val="000000">
+                      <a:alpha val="43137"/>
+                    </a:srgbClr>
+                  </a:outerShdw>
+                </a:effectLst>
+              </a:rPr>
+              <a:t>proyecto_comedores</a:t>
+            </a:r>
+            <a:r>
+              <a:rPr lang="es-AR" sz="2000" b="1" dirty="0">
+                <a:solidFill>
+                  <a:schemeClr val="bg1"/>
+                </a:solidFill>
+                <a:effectLst>
+                  <a:outerShdw blurRad="38100" dist="38100" dir="2700000" algn="tl">
+                    <a:srgbClr val="000000">
+                      <a:alpha val="43137"/>
+                    </a:srgbClr>
+                  </a:outerShdw>
+                </a:effectLst>
+              </a:rPr>
+              <a:t>)=&gt; </a:t>
             </a:r>
             <a:r>
               <a:rPr lang="es-AR" sz="2000" b="1" dirty="0" err="1">
@@ -8905,7 +8716,7 @@
         <p:spPr>
           <a:xfrm>
             <a:off x="351692" y="253218"/>
-            <a:ext cx="11648050" cy="7355860"/>
+            <a:ext cx="11648050" cy="7232749"/>
           </a:xfrm>
           <a:prstGeom prst="rect">
             <a:avLst/>
@@ -8978,49 +8789,153 @@
           </a:p>
           <a:p>
             <a:r>
-              <a:rPr lang="es-AR" sz="2400" b="1" dirty="0">
-                <a:solidFill>
-                  <a:schemeClr val="bg1"/>
-                </a:solidFill>
-                <a:effectLst>
-                  <a:outerShdw blurRad="38100" dist="38100" dir="2700000" algn="tl">
-                    <a:srgbClr val="000000">
-                      <a:alpha val="43137"/>
-                    </a:srgbClr>
-                  </a:outerShdw>
-                </a:effectLst>
-              </a:rPr>
-              <a:t>Seleccionamos Archivo =&gt; Abrir =&gt; Sitio Web =&gt; En Sistema de archivos nos dirigimos a la ruta de nuestra carpeta donde clonamos el proyecto comedores desde el repositorio GitHub =&gt; Seleccionamos la carpeta </a:t>
-            </a:r>
-            <a:r>
-              <a:rPr lang="es-AR" sz="2400" b="1" dirty="0" err="1">
-                <a:solidFill>
-                  <a:schemeClr val="bg1"/>
-                </a:solidFill>
-                <a:effectLst>
-                  <a:outerShdw blurRad="38100" dist="38100" dir="2700000" algn="tl">
-                    <a:srgbClr val="000000">
-                      <a:alpha val="43137"/>
-                    </a:srgbClr>
-                  </a:outerShdw>
-                </a:effectLst>
-              </a:rPr>
-              <a:t>ProyectoMetodologia</a:t>
-            </a:r>
-            <a:r>
-              <a:rPr lang="es-AR" sz="2400" b="1" dirty="0">
-                <a:solidFill>
-                  <a:schemeClr val="bg1"/>
-                </a:solidFill>
-                <a:effectLst>
-                  <a:outerShdw blurRad="38100" dist="38100" dir="2700000" algn="tl">
-                    <a:srgbClr val="000000">
-                      <a:alpha val="43137"/>
-                    </a:srgbClr>
-                  </a:outerShdw>
-                </a:effectLst>
-              </a:rPr>
-              <a:t> =&gt; ABRIR</a:t>
+              <a:rPr lang="es-AR" sz="2000" b="1" dirty="0">
+                <a:solidFill>
+                  <a:schemeClr val="bg1"/>
+                </a:solidFill>
+                <a:effectLst>
+                  <a:outerShdw blurRad="38100" dist="38100" dir="2700000" algn="tl">
+                    <a:srgbClr val="000000">
+                      <a:alpha val="43137"/>
+                    </a:srgbClr>
+                  </a:outerShdw>
+                </a:effectLst>
+              </a:rPr>
+              <a:t>Debemos ir a la pagina </a:t>
+            </a:r>
+            <a:r>
+              <a:rPr lang="es-AR" sz="2000" b="1" dirty="0" err="1">
+                <a:solidFill>
+                  <a:schemeClr val="bg1"/>
+                </a:solidFill>
+                <a:effectLst>
+                  <a:outerShdw blurRad="38100" dist="38100" dir="2700000" algn="tl">
+                    <a:srgbClr val="000000">
+                      <a:alpha val="43137"/>
+                    </a:srgbClr>
+                  </a:outerShdw>
+                </a:effectLst>
+              </a:rPr>
+              <a:t>MySql</a:t>
+            </a:r>
+            <a:r>
+              <a:rPr lang="es-AR" sz="2000" b="1" dirty="0">
+                <a:solidFill>
+                  <a:schemeClr val="bg1"/>
+                </a:solidFill>
+                <a:effectLst>
+                  <a:outerShdw blurRad="38100" dist="38100" dir="2700000" algn="tl">
+                    <a:srgbClr val="000000">
+                      <a:alpha val="43137"/>
+                    </a:srgbClr>
+                  </a:outerShdw>
+                </a:effectLst>
+              </a:rPr>
+              <a:t>  =&gt; Descargar el </a:t>
+            </a:r>
+            <a:r>
+              <a:rPr lang="es-AR" sz="2000" b="1" dirty="0" err="1">
+                <a:solidFill>
+                  <a:schemeClr val="bg1"/>
+                </a:solidFill>
+                <a:effectLst>
+                  <a:outerShdw blurRad="38100" dist="38100" dir="2700000" algn="tl">
+                    <a:srgbClr val="000000">
+                      <a:alpha val="43137"/>
+                    </a:srgbClr>
+                  </a:outerShdw>
+                </a:effectLst>
+              </a:rPr>
+              <a:t>Connector</a:t>
+            </a:r>
+            <a:r>
+              <a:rPr lang="es-AR" sz="2000" b="1" dirty="0">
+                <a:solidFill>
+                  <a:schemeClr val="bg1"/>
+                </a:solidFill>
+                <a:effectLst>
+                  <a:outerShdw blurRad="38100" dist="38100" dir="2700000" algn="tl">
+                    <a:srgbClr val="000000">
+                      <a:alpha val="43137"/>
+                    </a:srgbClr>
+                  </a:outerShdw>
+                </a:effectLst>
+              </a:rPr>
+              <a:t> Net para establecer la conexión entre el Proyecto y la Base de Datos. Link </a:t>
+            </a:r>
+            <a:r>
+              <a:rPr lang="es-AR" sz="2000" b="1" dirty="0" err="1">
+                <a:solidFill>
+                  <a:schemeClr val="bg1"/>
+                </a:solidFill>
+                <a:effectLst>
+                  <a:outerShdw blurRad="38100" dist="38100" dir="2700000" algn="tl">
+                    <a:srgbClr val="000000">
+                      <a:alpha val="43137"/>
+                    </a:srgbClr>
+                  </a:outerShdw>
+                </a:effectLst>
+              </a:rPr>
+              <a:t>Connector</a:t>
+            </a:r>
+            <a:r>
+              <a:rPr lang="es-AR" sz="2000" b="1" dirty="0">
+                <a:solidFill>
+                  <a:schemeClr val="bg1"/>
+                </a:solidFill>
+                <a:effectLst>
+                  <a:outerShdw blurRad="38100" dist="38100" dir="2700000" algn="tl">
+                    <a:srgbClr val="000000">
+                      <a:alpha val="43137"/>
+                    </a:srgbClr>
+                  </a:outerShdw>
+                </a:effectLst>
+              </a:rPr>
+              <a:t> </a:t>
+            </a:r>
+            <a:r>
+              <a:rPr lang="es-AR" sz="2000" b="1">
+                <a:solidFill>
+                  <a:schemeClr val="bg1"/>
+                </a:solidFill>
+                <a:effectLst>
+                  <a:outerShdw blurRad="38100" dist="38100" dir="2700000" algn="tl">
+                    <a:srgbClr val="000000">
+                      <a:alpha val="43137"/>
+                    </a:srgbClr>
+                  </a:outerShdw>
+                </a:effectLst>
+              </a:rPr>
+              <a:t>Net 8.0.23  =&gt; </a:t>
+            </a:r>
+            <a:endParaRPr lang="es-AR" sz="2000" b="1" dirty="0">
+              <a:solidFill>
+                <a:schemeClr val="bg1"/>
+              </a:solidFill>
+              <a:effectLst>
+                <a:outerShdw blurRad="38100" dist="38100" dir="2700000" algn="tl">
+                  <a:srgbClr val="000000">
+                    <a:alpha val="43137"/>
+                  </a:srgbClr>
+                </a:outerShdw>
+              </a:effectLst>
+            </a:endParaRPr>
+          </a:p>
+          <a:p>
+            <a:r>
+              <a:rPr lang="es-AR" sz="2000" b="1" dirty="0">
+                <a:solidFill>
+                  <a:srgbClr val="FF0000"/>
+                </a:solidFill>
+                <a:effectLst>
+                  <a:outerShdw blurRad="38100" dist="38100" dir="2700000" algn="tl">
+                    <a:srgbClr val="000000">
+                      <a:alpha val="43137"/>
+                    </a:srgbClr>
+                  </a:outerShdw>
+                </a:effectLst>
+              </a:rPr>
+              <a:t>https://downloads.mysql.com/archives/c-net/</a:t>
             </a:r>
           </a:p>
           <a:p>
@@ -9039,53 +8954,53 @@
           </a:p>
           <a:p>
             <a:r>
-              <a:rPr lang="es-AR" sz="2400" b="1" dirty="0">
-                <a:solidFill>
-                  <a:schemeClr val="bg1"/>
-                </a:solidFill>
-                <a:effectLst>
-                  <a:outerShdw blurRad="38100" dist="38100" dir="2700000" algn="tl">
-                    <a:srgbClr val="000000">
-                      <a:alpha val="43137"/>
-                    </a:srgbClr>
-                  </a:outerShdw>
-                </a:effectLst>
-              </a:rPr>
-              <a:t>Automáticamente el IDE va a asignar un </a:t>
-            </a:r>
-            <a:r>
-              <a:rPr lang="es-AR" sz="2400" b="1" dirty="0" err="1">
-                <a:solidFill>
-                  <a:schemeClr val="bg1"/>
-                </a:solidFill>
-                <a:effectLst>
-                  <a:outerShdw blurRad="38100" dist="38100" dir="2700000" algn="tl">
-                    <a:srgbClr val="000000">
-                      <a:alpha val="43137"/>
-                    </a:srgbClr>
-                  </a:outerShdw>
-                </a:effectLst>
-              </a:rPr>
-              <a:t>LocalHost</a:t>
-            </a:r>
-            <a:r>
-              <a:rPr lang="es-AR" sz="2400" b="1" dirty="0">
-                <a:solidFill>
-                  <a:schemeClr val="bg1"/>
-                </a:solidFill>
-                <a:effectLst>
-                  <a:outerShdw blurRad="38100" dist="38100" dir="2700000" algn="tl">
-                    <a:srgbClr val="000000">
-                      <a:alpha val="43137"/>
-                    </a:srgbClr>
-                  </a:outerShdw>
-                </a:effectLst>
-              </a:rPr>
-              <a:t> con un puerto aleatorio a nuestro Proyecto.</a:t>
-            </a:r>
-          </a:p>
-          <a:p>
-            <a:endParaRPr lang="es-AR" sz="2400" b="1" dirty="0">
+              <a:rPr lang="es-AR" sz="2000" b="1" dirty="0">
+                <a:solidFill>
+                  <a:schemeClr val="bg1"/>
+                </a:solidFill>
+                <a:effectLst>
+                  <a:outerShdw blurRad="38100" dist="38100" dir="2700000" algn="tl">
+                    <a:srgbClr val="000000">
+                      <a:alpha val="43137"/>
+                    </a:srgbClr>
+                  </a:outerShdw>
+                </a:effectLst>
+              </a:rPr>
+              <a:t>Seleccionamos Archivo =&gt; Abrir =&gt; Sitio Web =&gt; En Sistema de archivos nos dirigimos a la ruta de nuestra carpeta donde clonamos el proyecto comedores desde el repositorio GitHub =&gt; Seleccionamos la carpeta </a:t>
+            </a:r>
+            <a:r>
+              <a:rPr lang="es-AR" sz="2000" b="1" dirty="0" err="1">
+                <a:solidFill>
+                  <a:schemeClr val="bg1"/>
+                </a:solidFill>
+                <a:effectLst>
+                  <a:outerShdw blurRad="38100" dist="38100" dir="2700000" algn="tl">
+                    <a:srgbClr val="000000">
+                      <a:alpha val="43137"/>
+                    </a:srgbClr>
+                  </a:outerShdw>
+                </a:effectLst>
+              </a:rPr>
+              <a:t>ProyectoMetodologia</a:t>
+            </a:r>
+            <a:r>
+              <a:rPr lang="es-AR" sz="2000" b="1" dirty="0">
+                <a:solidFill>
+                  <a:schemeClr val="bg1"/>
+                </a:solidFill>
+                <a:effectLst>
+                  <a:outerShdw blurRad="38100" dist="38100" dir="2700000" algn="tl">
+                    <a:srgbClr val="000000">
+                      <a:alpha val="43137"/>
+                    </a:srgbClr>
+                  </a:outerShdw>
+                </a:effectLst>
+              </a:rPr>
+              <a:t> =&gt; ABRIR</a:t>
+            </a:r>
+          </a:p>
+          <a:p>
+            <a:endParaRPr lang="es-AR" sz="2000" b="1" dirty="0">
               <a:solidFill>
                 <a:schemeClr val="bg1"/>
               </a:solidFill>
@@ -9100,7 +9015,68 @@
           </a:p>
           <a:p>
             <a:r>
-              <a:rPr lang="es-AR" sz="2400" b="1" dirty="0">
+              <a:rPr lang="es-AR" sz="2000" b="1" dirty="0">
+                <a:solidFill>
+                  <a:schemeClr val="bg1"/>
+                </a:solidFill>
+                <a:effectLst>
+                  <a:outerShdw blurRad="38100" dist="38100" dir="2700000" algn="tl">
+                    <a:srgbClr val="000000">
+                      <a:alpha val="43137"/>
+                    </a:srgbClr>
+                  </a:outerShdw>
+                </a:effectLst>
+              </a:rPr>
+              <a:t>Automáticamente el IDE va a asignar un </a:t>
+            </a:r>
+            <a:r>
+              <a:rPr lang="es-AR" sz="2000" b="1" dirty="0" err="1">
+                <a:solidFill>
+                  <a:schemeClr val="bg1"/>
+                </a:solidFill>
+                <a:effectLst>
+                  <a:outerShdw blurRad="38100" dist="38100" dir="2700000" algn="tl">
+                    <a:srgbClr val="000000">
+                      <a:alpha val="43137"/>
+                    </a:srgbClr>
+                  </a:outerShdw>
+                </a:effectLst>
+              </a:rPr>
+              <a:t>LocalHost</a:t>
+            </a:r>
+            <a:r>
+              <a:rPr lang="es-AR" sz="2000" b="1" dirty="0">
+                <a:solidFill>
+                  <a:schemeClr val="bg1"/>
+                </a:solidFill>
+                <a:effectLst>
+                  <a:outerShdw blurRad="38100" dist="38100" dir="2700000" algn="tl">
+                    <a:srgbClr val="000000">
+                      <a:alpha val="43137"/>
+                    </a:srgbClr>
+                  </a:outerShdw>
+                </a:effectLst>
+              </a:rPr>
+              <a:t> con un puerto aleatorio a nuestro Proyecto.</a:t>
+            </a:r>
+          </a:p>
+          <a:p>
+            <a:endParaRPr lang="es-AR" sz="2000" b="1" dirty="0">
+              <a:solidFill>
+                <a:schemeClr val="bg1"/>
+              </a:solidFill>
+              <a:effectLst>
+                <a:outerShdw blurRad="38100" dist="38100" dir="2700000" algn="tl">
+                  <a:srgbClr val="000000">
+                    <a:alpha val="43137"/>
+                  </a:srgbClr>
+                </a:outerShdw>
+              </a:effectLst>
+            </a:endParaRPr>
+          </a:p>
+          <a:p>
+            <a:r>
+              <a:rPr lang="es-AR" sz="2000" b="1" dirty="0">
                 <a:solidFill>
                   <a:schemeClr val="bg1"/>
                 </a:solidFill>
@@ -9115,7 +9091,7 @@
               <a:t>Abrimos el Explorador de Soluciones nos dirigimos a la carpeta Formulario =&gt; seleccionamos el archivo principal.aspx (Vista) =&gt; </a:t>
             </a:r>
             <a:r>
-              <a:rPr lang="es-AR" sz="2400" b="1" dirty="0" err="1">
+              <a:rPr lang="es-AR" sz="2000" b="1" dirty="0" err="1">
                 <a:solidFill>
                   <a:schemeClr val="bg1"/>
                 </a:solidFill>
@@ -9130,7 +9106,7 @@
               <a:t>click</a:t>
             </a:r>
             <a:r>
-              <a:rPr lang="es-AR" sz="2400" b="1" dirty="0">
+              <a:rPr lang="es-AR" sz="2000" b="1" dirty="0">
                 <a:solidFill>
                   <a:schemeClr val="bg1"/>
                 </a:solidFill>
@@ -9145,7 +9121,7 @@
               <a:t> derecho =&gt; ver en explorador Google Chrome =&gt; Nos Compila el Proyecto y abre el mismo para comenzar a interactuar con el Desarrollo Web Comedores (</a:t>
             </a:r>
             <a:r>
-              <a:rPr lang="es-AR" sz="2400" b="1" dirty="0">
+              <a:rPr lang="es-AR" sz="2000" b="1" dirty="0">
                 <a:solidFill>
                   <a:srgbClr val="FF0000"/>
                 </a:solidFill>
@@ -9160,7 +9136,7 @@
               <a:t>GUIA FULL DETALLADA PASO A PASO PROYECTO COMEDORES</a:t>
             </a:r>
             <a:r>
-              <a:rPr lang="es-AR" sz="2400" b="1" dirty="0">
+              <a:rPr lang="es-AR" sz="2000" b="1" dirty="0">
                 <a:solidFill>
                   <a:schemeClr val="bg1"/>
                 </a:solidFill>

</xml_diff>